<commit_message>
fixed a small issue where i was using city-level population census data to calculate county-level metrics (now i use county-level population census data)
</commit_message>
<xml_diff>
--- a/n1health_datachallenge_presentation.pptx
+++ b/n1health_datachallenge_presentation.pptx
@@ -132,6 +132,130 @@
 </p:presentation>
 </file>
 
+<file path=ppt/revisionInfo.xml><?xml version="1.0" encoding="utf-8"?>
+<p1510:revInfo xmlns:a="http://schemas.openxmlformats.org/drawingml/2006/main" xmlns:r="http://schemas.openxmlformats.org/officeDocument/2006/relationships" xmlns:p1510="http://schemas.microsoft.com/office/powerpoint/2015/10/main">
+  <p1510:revLst>
+    <p1510:client id="{C7D5405E-F458-4411-BD4F-0B3C69117531}" v="38" dt="2025-10-08T15:22:50.964"/>
+  </p1510:revLst>
+</p1510:revInfo>
+</file>
+
+<file path=ppt/changesInfos/changesInfo1.xml><?xml version="1.0" encoding="utf-8"?>
+<pc:chgInfo xmlns:a="http://schemas.openxmlformats.org/drawingml/2006/main" xmlns:r="http://schemas.openxmlformats.org/officeDocument/2006/relationships" xmlns:ac="http://schemas.microsoft.com/office/drawing/2013/main/command" xmlns:pc="http://schemas.microsoft.com/office/powerpoint/2013/main/command">
+  <pc:docChgLst>
+    <pc:chgData name="Laima Ozola-Szoke" userId="4e7b2398847a2a0c" providerId="LiveId" clId="{C7D5405E-F458-4411-BD4F-0B3C69117531}"/>
+    <pc:docChg chg="undo custSel modSld">
+      <pc:chgData name="Laima Ozola-Szoke" userId="4e7b2398847a2a0c" providerId="LiveId" clId="{C7D5405E-F458-4411-BD4F-0B3C69117531}" dt="2025-10-08T15:22:50.964" v="51" actId="20577"/>
+      <pc:docMkLst>
+        <pc:docMk/>
+      </pc:docMkLst>
+      <pc:sldChg chg="addSp delSp modSp mod addAnim delAnim modAnim">
+        <pc:chgData name="Laima Ozola-Szoke" userId="4e7b2398847a2a0c" providerId="LiveId" clId="{C7D5405E-F458-4411-BD4F-0B3C69117531}" dt="2025-10-08T15:22:50.964" v="51" actId="20577"/>
+        <pc:sldMkLst>
+          <pc:docMk/>
+          <pc:sldMk cId="0" sldId="259"/>
+        </pc:sldMkLst>
+        <pc:spChg chg="mod">
+          <ac:chgData name="Laima Ozola-Szoke" userId="4e7b2398847a2a0c" providerId="LiveId" clId="{C7D5405E-F458-4411-BD4F-0B3C69117531}" dt="2025-10-08T15:18:07.574" v="13"/>
+          <ac:spMkLst>
+            <pc:docMk/>
+            <pc:sldMk cId="0" sldId="259"/>
+            <ac:spMk id="11" creationId="{F6F973A8-319D-AA38-4431-F86FE82632C0}"/>
+          </ac:spMkLst>
+        </pc:spChg>
+        <pc:spChg chg="del">
+          <ac:chgData name="Laima Ozola-Szoke" userId="4e7b2398847a2a0c" providerId="LiveId" clId="{C7D5405E-F458-4411-BD4F-0B3C69117531}" dt="2025-10-08T15:17:42.287" v="7" actId="478"/>
+          <ac:spMkLst>
+            <pc:docMk/>
+            <pc:sldMk cId="0" sldId="259"/>
+            <ac:spMk id="12" creationId="{61F3E996-B69D-065C-8D3F-7907E2A3BCB3}"/>
+          </ac:spMkLst>
+        </pc:spChg>
+        <pc:spChg chg="add mod">
+          <ac:chgData name="Laima Ozola-Szoke" userId="4e7b2398847a2a0c" providerId="LiveId" clId="{C7D5405E-F458-4411-BD4F-0B3C69117531}" dt="2025-10-08T15:17:42.568" v="8"/>
+          <ac:spMkLst>
+            <pc:docMk/>
+            <pc:sldMk cId="0" sldId="259"/>
+            <ac:spMk id="13" creationId="{68469A16-C723-AF5E-2FE2-834D89704080}"/>
+          </ac:spMkLst>
+        </pc:spChg>
+        <pc:spChg chg="mod">
+          <ac:chgData name="Laima Ozola-Szoke" userId="4e7b2398847a2a0c" providerId="LiveId" clId="{C7D5405E-F458-4411-BD4F-0B3C69117531}" dt="2025-10-08T15:22:50.964" v="51" actId="20577"/>
+          <ac:spMkLst>
+            <pc:docMk/>
+            <pc:sldMk cId="0" sldId="259"/>
+            <ac:spMk id="40" creationId="{41800103-6D14-6E38-2F9B-495B23622AA9}"/>
+          </ac:spMkLst>
+        </pc:spChg>
+        <pc:picChg chg="add del">
+          <ac:chgData name="Laima Ozola-Szoke" userId="4e7b2398847a2a0c" providerId="LiveId" clId="{C7D5405E-F458-4411-BD4F-0B3C69117531}" dt="2025-10-08T15:17:19.481" v="2" actId="22"/>
+          <ac:picMkLst>
+            <pc:docMk/>
+            <pc:sldMk cId="0" sldId="259"/>
+            <ac:picMk id="3" creationId="{93631BF3-1713-66E2-56C8-E6E8607AE410}"/>
+          </ac:picMkLst>
+        </pc:picChg>
+        <pc:picChg chg="add mod">
+          <ac:chgData name="Laima Ozola-Szoke" userId="4e7b2398847a2a0c" providerId="LiveId" clId="{C7D5405E-F458-4411-BD4F-0B3C69117531}" dt="2025-10-08T15:17:37.298" v="6" actId="1076"/>
+          <ac:picMkLst>
+            <pc:docMk/>
+            <pc:sldMk cId="0" sldId="259"/>
+            <ac:picMk id="8" creationId="{0046886C-652D-CD22-5505-67B9AE1D2912}"/>
+          </ac:picMkLst>
+        </pc:picChg>
+        <pc:picChg chg="add del">
+          <ac:chgData name="Laima Ozola-Szoke" userId="4e7b2398847a2a0c" providerId="LiveId" clId="{C7D5405E-F458-4411-BD4F-0B3C69117531}" dt="2025-10-08T15:17:33.746" v="4" actId="478"/>
+          <ac:picMkLst>
+            <pc:docMk/>
+            <pc:sldMk cId="0" sldId="259"/>
+            <ac:picMk id="10" creationId="{63386CD9-E8D4-76E3-9081-E1FB17F8A605}"/>
+          </ac:picMkLst>
+        </pc:picChg>
+      </pc:sldChg>
+      <pc:sldChg chg="addSp delSp modSp mod delAnim">
+        <pc:chgData name="Laima Ozola-Szoke" userId="4e7b2398847a2a0c" providerId="LiveId" clId="{C7D5405E-F458-4411-BD4F-0B3C69117531}" dt="2025-10-08T15:19:54.844" v="26" actId="1076"/>
+        <pc:sldMkLst>
+          <pc:docMk/>
+          <pc:sldMk cId="0" sldId="260"/>
+        </pc:sldMkLst>
+        <pc:spChg chg="mod">
+          <ac:chgData name="Laima Ozola-Szoke" userId="4e7b2398847a2a0c" providerId="LiveId" clId="{C7D5405E-F458-4411-BD4F-0B3C69117531}" dt="2025-10-08T15:19:01.474" v="17"/>
+          <ac:spMkLst>
+            <pc:docMk/>
+            <pc:sldMk cId="0" sldId="260"/>
+            <ac:spMk id="10" creationId="{F6FA582C-8E6B-171A-380F-803A3C1D0B82}"/>
+          </ac:spMkLst>
+        </pc:spChg>
+        <pc:spChg chg="mod">
+          <ac:chgData name="Laima Ozola-Szoke" userId="4e7b2398847a2a0c" providerId="LiveId" clId="{C7D5405E-F458-4411-BD4F-0B3C69117531}" dt="2025-10-08T15:19:14.934" v="18"/>
+          <ac:spMkLst>
+            <pc:docMk/>
+            <pc:sldMk cId="0" sldId="260"/>
+            <ac:spMk id="11" creationId="{D0CE07BE-EE4E-EA1B-F676-2029725F0768}"/>
+          </ac:spMkLst>
+        </pc:spChg>
+        <pc:picChg chg="add mod">
+          <ac:chgData name="Laima Ozola-Szoke" userId="4e7b2398847a2a0c" providerId="LiveId" clId="{C7D5405E-F458-4411-BD4F-0B3C69117531}" dt="2025-10-08T15:19:54.844" v="26" actId="1076"/>
+          <ac:picMkLst>
+            <pc:docMk/>
+            <pc:sldMk cId="0" sldId="260"/>
+            <ac:picMk id="3" creationId="{83DBAEA6-4227-8BDA-A1E9-467163D554BD}"/>
+          </ac:picMkLst>
+        </pc:picChg>
+        <pc:picChg chg="del">
+          <ac:chgData name="Laima Ozola-Szoke" userId="4e7b2398847a2a0c" providerId="LiveId" clId="{C7D5405E-F458-4411-BD4F-0B3C69117531}" dt="2025-10-08T15:19:35.805" v="19" actId="478"/>
+          <ac:picMkLst>
+            <pc:docMk/>
+            <pc:sldMk cId="0" sldId="260"/>
+            <ac:picMk id="8" creationId="{603EC3C9-A604-D8B7-B37C-649B087D24C0}"/>
+          </ac:picMkLst>
+        </pc:picChg>
+      </pc:sldChg>
+    </pc:docChg>
+  </pc:docChgLst>
+</pc:chgInfo>
+</file>
+
 <file path=ppt/notesMasters/notesMaster1.xml><?xml version="1.0" encoding="utf-8"?>
 <p:notesMaster xmlns:a="http://schemas.openxmlformats.org/drawingml/2006/main" xmlns:r="http://schemas.openxmlformats.org/officeDocument/2006/relationships" xmlns:p="http://schemas.openxmlformats.org/presentationml/2006/main">
   <p:cSld>
@@ -214,7 +338,7 @@
           <a:p>
             <a:fld id="{5B1568B6-2878-493B-8FB3-6F4B54E84A2B}" type="datetimeFigureOut">
               <a:rPr lang="en-US" smtClean="0"/>
-              <a:t>10/6/2025</a:t>
+              <a:t>10/8/2025</a:t>
             </a:fld>
             <a:endParaRPr lang="en-US"/>
           </a:p>
@@ -997,7 +1121,7 @@
             <a:fld id="{1D8BD707-D9CF-40AE-B4C6-C98DA3205C09}" type="datetimeFigureOut">
               <a:rPr lang="en-US" smtClean="0"/>
               <a:pPr/>
-              <a:t>10/6/2025</a:t>
+              <a:t>10/8/2025</a:t>
             </a:fld>
             <a:endParaRPr lang="en-US"/>
           </a:p>
@@ -1162,7 +1286,7 @@
             <a:fld id="{1D8BD707-D9CF-40AE-B4C6-C98DA3205C09}" type="datetimeFigureOut">
               <a:rPr lang="en-US" smtClean="0"/>
               <a:pPr/>
-              <a:t>10/6/2025</a:t>
+              <a:t>10/8/2025</a:t>
             </a:fld>
             <a:endParaRPr lang="en-US"/>
           </a:p>
@@ -1337,7 +1461,7 @@
             <a:fld id="{1D8BD707-D9CF-40AE-B4C6-C98DA3205C09}" type="datetimeFigureOut">
               <a:rPr lang="en-US" smtClean="0"/>
               <a:pPr/>
-              <a:t>10/6/2025</a:t>
+              <a:t>10/8/2025</a:t>
             </a:fld>
             <a:endParaRPr lang="en-US"/>
           </a:p>
@@ -1502,7 +1626,7 @@
             <a:fld id="{1D8BD707-D9CF-40AE-B4C6-C98DA3205C09}" type="datetimeFigureOut">
               <a:rPr lang="en-US" smtClean="0"/>
               <a:pPr/>
-              <a:t>10/6/2025</a:t>
+              <a:t>10/8/2025</a:t>
             </a:fld>
             <a:endParaRPr lang="en-US"/>
           </a:p>
@@ -1744,7 +1868,7 @@
             <a:fld id="{1D8BD707-D9CF-40AE-B4C6-C98DA3205C09}" type="datetimeFigureOut">
               <a:rPr lang="en-US" smtClean="0"/>
               <a:pPr/>
-              <a:t>10/6/2025</a:t>
+              <a:t>10/8/2025</a:t>
             </a:fld>
             <a:endParaRPr lang="en-US"/>
           </a:p>
@@ -2026,7 +2150,7 @@
             <a:fld id="{1D8BD707-D9CF-40AE-B4C6-C98DA3205C09}" type="datetimeFigureOut">
               <a:rPr lang="en-US" smtClean="0"/>
               <a:pPr/>
-              <a:t>10/6/2025</a:t>
+              <a:t>10/8/2025</a:t>
             </a:fld>
             <a:endParaRPr lang="en-US"/>
           </a:p>
@@ -2442,7 +2566,7 @@
             <a:fld id="{1D8BD707-D9CF-40AE-B4C6-C98DA3205C09}" type="datetimeFigureOut">
               <a:rPr lang="en-US" smtClean="0"/>
               <a:pPr/>
-              <a:t>10/6/2025</a:t>
+              <a:t>10/8/2025</a:t>
             </a:fld>
             <a:endParaRPr lang="en-US"/>
           </a:p>
@@ -2556,7 +2680,7 @@
             <a:fld id="{1D8BD707-D9CF-40AE-B4C6-C98DA3205C09}" type="datetimeFigureOut">
               <a:rPr lang="en-US" smtClean="0"/>
               <a:pPr/>
-              <a:t>10/6/2025</a:t>
+              <a:t>10/8/2025</a:t>
             </a:fld>
             <a:endParaRPr lang="en-US"/>
           </a:p>
@@ -2648,7 +2772,7 @@
             <a:fld id="{1D8BD707-D9CF-40AE-B4C6-C98DA3205C09}" type="datetimeFigureOut">
               <a:rPr lang="en-US" smtClean="0"/>
               <a:pPr/>
-              <a:t>10/6/2025</a:t>
+              <a:t>10/8/2025</a:t>
             </a:fld>
             <a:endParaRPr lang="en-US"/>
           </a:p>
@@ -2920,7 +3044,7 @@
             <a:fld id="{1D8BD707-D9CF-40AE-B4C6-C98DA3205C09}" type="datetimeFigureOut">
               <a:rPr lang="en-US" smtClean="0"/>
               <a:pPr/>
-              <a:t>10/6/2025</a:t>
+              <a:t>10/8/2025</a:t>
             </a:fld>
             <a:endParaRPr lang="en-US"/>
           </a:p>
@@ -3169,7 +3293,7 @@
             <a:fld id="{1D8BD707-D9CF-40AE-B4C6-C98DA3205C09}" type="datetimeFigureOut">
               <a:rPr lang="en-US" smtClean="0"/>
               <a:pPr/>
-              <a:t>10/6/2025</a:t>
+              <a:t>10/8/2025</a:t>
             </a:fld>
             <a:endParaRPr lang="en-US"/>
           </a:p>
@@ -3377,7 +3501,7 @@
             <a:fld id="{1D8BD707-D9CF-40AE-B4C6-C98DA3205C09}" type="datetimeFigureOut">
               <a:rPr lang="en-US" smtClean="0"/>
               <a:pPr/>
-              <a:t>10/6/2025</a:t>
+              <a:t>10/8/2025</a:t>
             </a:fld>
             <a:endParaRPr lang="en-US"/>
           </a:p>
@@ -6402,6 +6526,16 @@
           </a:p>
           <a:p>
             <a:r>
+              <a:rPr lang="en-US" sz="2400">
+                <a:solidFill>
+                  <a:srgbClr val="49535A"/>
+                </a:solidFill>
+                <a:latin typeface="Arial" panose="020B0604020202020204" pitchFamily="34" charset="0"/>
+                <a:cs typeface="Arial" panose="020B0604020202020204" pitchFamily="34" charset="0"/>
+              </a:rPr>
+              <a:t>Use </a:t>
+            </a:r>
+            <a:r>
               <a:rPr lang="en-US" sz="2400" dirty="0">
                 <a:solidFill>
                   <a:srgbClr val="49535A"/>
@@ -6409,7 +6543,7 @@
                 <a:latin typeface="Arial" panose="020B0604020202020204" pitchFamily="34" charset="0"/>
                 <a:cs typeface="Arial" panose="020B0604020202020204" pitchFamily="34" charset="0"/>
               </a:rPr>
-              <a:t>Combine data from the County Demographics dataset</a:t>
+              <a:t>data from the County Demographics dataset</a:t>
             </a:r>
             <a:r>
               <a:rPr lang="en-US" sz="2400" baseline="30000" dirty="0">
@@ -6419,7 +6553,27 @@
                 <a:latin typeface="Arial" panose="020B0604020202020204" pitchFamily="34" charset="0"/>
                 <a:cs typeface="Arial" panose="020B0604020202020204" pitchFamily="34" charset="0"/>
               </a:rPr>
-              <a:t>[2]</a:t>
+              <a:t>[2</a:t>
+            </a:r>
+            <a:r>
+              <a:rPr lang="en-US" sz="2400" baseline="30000">
+                <a:solidFill>
+                  <a:srgbClr val="49535A"/>
+                </a:solidFill>
+                <a:latin typeface="Arial" panose="020B0604020202020204" pitchFamily="34" charset="0"/>
+                <a:cs typeface="Arial" panose="020B0604020202020204" pitchFamily="34" charset="0"/>
+              </a:rPr>
+              <a:t>]</a:t>
+            </a:r>
+            <a:r>
+              <a:rPr lang="en-US" sz="2400">
+                <a:solidFill>
+                  <a:srgbClr val="49535A"/>
+                </a:solidFill>
+                <a:latin typeface="Arial" panose="020B0604020202020204" pitchFamily="34" charset="0"/>
+                <a:cs typeface="Arial" panose="020B0604020202020204" pitchFamily="34" charset="0"/>
+              </a:rPr>
+              <a:t> with </a:t>
             </a:r>
             <a:r>
               <a:rPr lang="en-US" sz="2400" dirty="0">
@@ -6429,27 +6583,7 @@
                 <a:latin typeface="Arial" panose="020B0604020202020204" pitchFamily="34" charset="0"/>
                 <a:cs typeface="Arial" panose="020B0604020202020204" pitchFamily="34" charset="0"/>
               </a:rPr>
-              <a:t> with population census information</a:t>
-            </a:r>
-            <a:r>
-              <a:rPr lang="en-US" sz="2400" baseline="30000" dirty="0">
-                <a:solidFill>
-                  <a:srgbClr val="49535A"/>
-                </a:solidFill>
-                <a:latin typeface="Arial" panose="020B0604020202020204" pitchFamily="34" charset="0"/>
-                <a:cs typeface="Arial" panose="020B0604020202020204" pitchFamily="34" charset="0"/>
-              </a:rPr>
-              <a:t>[1]</a:t>
-            </a:r>
-            <a:r>
-              <a:rPr lang="en-US" sz="2400" dirty="0">
-                <a:solidFill>
-                  <a:srgbClr val="49535A"/>
-                </a:solidFill>
-                <a:latin typeface="Arial" panose="020B0604020202020204" pitchFamily="34" charset="0"/>
-                <a:cs typeface="Arial" panose="020B0604020202020204" pitchFamily="34" charset="0"/>
-              </a:rPr>
-              <a:t> to estimate total 65+ population (Medicare-eligible) in the top 10 high-priority counties</a:t>
+              <a:t>population census information to estimate total 65+ population (Medicare-eligible) in the top 10 high-priority counties</a:t>
             </a:r>
             <a:endParaRPr lang="en-US" sz="2400" b="1" dirty="0">
               <a:solidFill>
@@ -6611,36 +6745,6 @@
           </a:p>
         </p:txBody>
       </p:sp>
-      <p:pic>
-        <p:nvPicPr>
-          <p:cNvPr id="10" name="Picture 9">
-            <a:extLst>
-              <a:ext uri="{FF2B5EF4-FFF2-40B4-BE49-F238E27FC236}">
-                <a16:creationId xmlns:a16="http://schemas.microsoft.com/office/drawing/2014/main" id="{63386CD9-E8D4-76E3-9081-E1FB17F8A605}"/>
-              </a:ext>
-            </a:extLst>
-          </p:cNvPr>
-          <p:cNvPicPr>
-            <a:picLocks noChangeAspect="1"/>
-          </p:cNvPicPr>
-          <p:nvPr/>
-        </p:nvPicPr>
-        <p:blipFill>
-          <a:blip r:embed="rId5"/>
-          <a:stretch>
-            <a:fillRect/>
-          </a:stretch>
-        </p:blipFill>
-        <p:spPr>
-          <a:xfrm>
-            <a:off x="6176279" y="1560138"/>
-            <a:ext cx="11660227" cy="6354062"/>
-          </a:xfrm>
-          <a:prstGeom prst="rect">
-            <a:avLst/>
-          </a:prstGeom>
-        </p:spPr>
-      </p:pic>
       <p:sp>
         <p:nvSpPr>
           <p:cNvPr id="11" name="Rectangle 10">
@@ -6706,7 +6810,7 @@
                 <a:latin typeface="Arial" panose="020B0604020202020204" pitchFamily="34" charset="0"/>
                 <a:cs typeface="Arial" panose="020B0604020202020204" pitchFamily="34" charset="0"/>
               </a:rPr>
-              <a:t>237,045</a:t>
+              <a:t>657,145</a:t>
             </a:r>
             <a:r>
               <a:rPr lang="en-US" sz="2400" dirty="0">
@@ -6738,7 +6842,7 @@
                 <a:latin typeface="Arial" panose="020B0604020202020204" pitchFamily="34" charset="0"/>
                 <a:cs typeface="Arial" panose="020B0604020202020204" pitchFamily="34" charset="0"/>
               </a:rPr>
-              <a:t>65,823</a:t>
+              <a:t>176,975</a:t>
             </a:r>
             <a:r>
               <a:rPr lang="en-US" sz="2400" dirty="0">
@@ -6753,12 +6857,42 @@
           </a:p>
         </p:txBody>
       </p:sp>
-      <p:sp>
-        <p:nvSpPr>
-          <p:cNvPr id="12" name="TextBox 5">
+      <p:pic>
+        <p:nvPicPr>
+          <p:cNvPr id="8" name="Picture 7">
             <a:extLst>
               <a:ext uri="{FF2B5EF4-FFF2-40B4-BE49-F238E27FC236}">
-                <a16:creationId xmlns:a16="http://schemas.microsoft.com/office/drawing/2014/main" id="{61F3E996-B69D-065C-8D3F-7907E2A3BCB3}"/>
+                <a16:creationId xmlns:a16="http://schemas.microsoft.com/office/drawing/2014/main" id="{0046886C-652D-CD22-5505-67B9AE1D2912}"/>
+              </a:ext>
+            </a:extLst>
+          </p:cNvPr>
+          <p:cNvPicPr>
+            <a:picLocks noChangeAspect="1"/>
+          </p:cNvPicPr>
+          <p:nvPr/>
+        </p:nvPicPr>
+        <p:blipFill>
+          <a:blip r:embed="rId5"/>
+          <a:stretch>
+            <a:fillRect/>
+          </a:stretch>
+        </p:blipFill>
+        <p:spPr>
+          <a:xfrm>
+            <a:off x="6297722" y="1626282"/>
+            <a:ext cx="11707859" cy="6325483"/>
+          </a:xfrm>
+          <a:prstGeom prst="rect">
+            <a:avLst/>
+          </a:prstGeom>
+        </p:spPr>
+      </p:pic>
+      <p:sp>
+        <p:nvSpPr>
+          <p:cNvPr id="13" name="TextBox 5">
+            <a:extLst>
+              <a:ext uri="{FF2B5EF4-FFF2-40B4-BE49-F238E27FC236}">
+                <a16:creationId xmlns:a16="http://schemas.microsoft.com/office/drawing/2014/main" id="{68469A16-C723-AF5E-2FE2-834D89704080}"/>
               </a:ext>
             </a:extLst>
           </p:cNvPr>
@@ -7037,39 +7171,21 @@
                                   </p:childTnLst>
                                 </p:cTn>
                               </p:par>
-                            </p:childTnLst>
-                          </p:cTn>
-                        </p:par>
-                      </p:childTnLst>
-                    </p:cTn>
-                  </p:par>
-                  <p:par>
-                    <p:cTn id="19" fill="hold">
-                      <p:stCondLst>
-                        <p:cond delay="indefinite"/>
-                      </p:stCondLst>
-                      <p:childTnLst>
-                        <p:par>
-                          <p:cTn id="20" fill="hold">
-                            <p:stCondLst>
-                              <p:cond delay="0"/>
-                            </p:stCondLst>
-                            <p:childTnLst>
                               <p:par>
-                                <p:cTn id="21" presetID="1" presetClass="entr" presetSubtype="0" fill="hold" grpId="0" nodeType="clickEffect">
+                                <p:cTn id="19" presetID="1" presetClass="entr" presetSubtype="0" fill="hold" grpId="0" nodeType="withEffect">
                                   <p:stCondLst>
                                     <p:cond delay="0"/>
                                   </p:stCondLst>
                                   <p:childTnLst>
                                     <p:set>
                                       <p:cBhvr>
-                                        <p:cTn id="22" dur="1" fill="hold">
+                                        <p:cTn id="20" dur="1" fill="hold">
                                           <p:stCondLst>
                                             <p:cond delay="0"/>
                                           </p:stCondLst>
                                         </p:cTn>
                                         <p:tgtEl>
-                                          <p:spTgt spid="12"/>
+                                          <p:spTgt spid="11"/>
                                         </p:tgtEl>
                                         <p:attrNameLst>
                                           <p:attrName>style.visibility</p:attrName>
@@ -7082,8 +7198,26 @@
                                   </p:childTnLst>
                                 </p:cTn>
                               </p:par>
+                            </p:childTnLst>
+                          </p:cTn>
+                        </p:par>
+                      </p:childTnLst>
+                    </p:cTn>
+                  </p:par>
+                  <p:par>
+                    <p:cTn id="21" fill="hold">
+                      <p:stCondLst>
+                        <p:cond delay="indefinite"/>
+                      </p:stCondLst>
+                      <p:childTnLst>
+                        <p:par>
+                          <p:cTn id="22" fill="hold">
+                            <p:stCondLst>
+                              <p:cond delay="0"/>
+                            </p:stCondLst>
+                            <p:childTnLst>
                               <p:par>
-                                <p:cTn id="23" presetID="1" presetClass="entr" presetSubtype="0" fill="hold" nodeType="withEffect">
+                                <p:cTn id="23" presetID="1" presetClass="entr" presetSubtype="0" fill="hold" grpId="0" nodeType="clickEffect">
                                   <p:stCondLst>
                                     <p:cond delay="0"/>
                                   </p:stCondLst>
@@ -7096,34 +7230,7 @@
                                           </p:stCondLst>
                                         </p:cTn>
                                         <p:tgtEl>
-                                          <p:spTgt spid="10"/>
-                                        </p:tgtEl>
-                                        <p:attrNameLst>
-                                          <p:attrName>style.visibility</p:attrName>
-                                        </p:attrNameLst>
-                                      </p:cBhvr>
-                                      <p:to>
-                                        <p:strVal val="visible"/>
-                                      </p:to>
-                                    </p:set>
-                                  </p:childTnLst>
-                                </p:cTn>
-                              </p:par>
-                              <p:par>
-                                <p:cTn id="25" presetID="1" presetClass="entr" presetSubtype="0" fill="hold" grpId="0" nodeType="withEffect">
-                                  <p:stCondLst>
-                                    <p:cond delay="0"/>
-                                  </p:stCondLst>
-                                  <p:childTnLst>
-                                    <p:set>
-                                      <p:cBhvr>
-                                        <p:cTn id="26" dur="1" fill="hold">
-                                          <p:stCondLst>
-                                            <p:cond delay="0"/>
-                                          </p:stCondLst>
-                                        </p:cTn>
-                                        <p:tgtEl>
-                                          <p:spTgt spid="11"/>
+                                          <p:spTgt spid="13"/>
                                         </p:tgtEl>
                                         <p:attrNameLst>
                                           <p:attrName>style.visibility</p:attrName>
@@ -7168,7 +7275,7 @@
       <p:bldP spid="41" grpId="0" animBg="1"/>
       <p:bldP spid="7" grpId="0"/>
       <p:bldP spid="11" grpId="0" animBg="1"/>
-      <p:bldP spid="12" grpId="0"/>
+      <p:bldP spid="13" grpId="0"/>
     </p:bldLst>
   </p:timing>
 </p:sld>
@@ -8401,7 +8508,7 @@
                 <a:latin typeface="Arial" panose="020B0604020202020204" pitchFamily="34" charset="0"/>
                 <a:cs typeface="Arial" panose="020B0604020202020204" pitchFamily="34" charset="0"/>
               </a:rPr>
-              <a:t>237,045 individuals</a:t>
+              <a:t>657,145 individuals</a:t>
             </a:r>
             <a:r>
               <a:rPr lang="en-US" sz="2400" baseline="30000" dirty="0">
@@ -8518,7 +8625,7 @@
                 <a:latin typeface="Arial" panose="020B0604020202020204" pitchFamily="34" charset="0"/>
                 <a:cs typeface="Arial" panose="020B0604020202020204" pitchFamily="34" charset="0"/>
               </a:rPr>
-              <a:t>49,977 of these individuals</a:t>
+              <a:t>138,549 of these individuals</a:t>
             </a:r>
             <a:r>
               <a:rPr lang="en-US" sz="2400" dirty="0">
@@ -8790,10 +8897,10 @@
       </p:sp>
       <p:pic>
         <p:nvPicPr>
-          <p:cNvPr id="8" name="Picture 7">
+          <p:cNvPr id="3" name="Picture 2" descr="A graph showing the cost of savings&#10;&#10;AI-generated content may be incorrect.">
             <a:extLst>
               <a:ext uri="{FF2B5EF4-FFF2-40B4-BE49-F238E27FC236}">
-                <a16:creationId xmlns:a16="http://schemas.microsoft.com/office/drawing/2014/main" id="{603EC3C9-A604-D8B7-B37C-649B087D24C0}"/>
+                <a16:creationId xmlns:a16="http://schemas.microsoft.com/office/drawing/2014/main" id="{83DBAEA6-4227-8BDA-A1E9-467163D554BD}"/>
               </a:ext>
             </a:extLst>
           </p:cNvPr>
@@ -8803,15 +8910,21 @@
           <p:nvPr/>
         </p:nvPicPr>
         <p:blipFill>
-          <a:blip r:embed="rId5"/>
+          <a:blip r:embed="rId5">
+            <a:extLst>
+              <a:ext uri="{28A0092B-C50C-407E-A947-70E740481C1C}">
+                <a14:useLocalDpi xmlns:a14="http://schemas.microsoft.com/office/drawing/2010/main" val="0"/>
+              </a:ext>
+            </a:extLst>
+          </a:blip>
           <a:stretch>
             <a:fillRect/>
           </a:stretch>
         </p:blipFill>
         <p:spPr>
           <a:xfrm>
-            <a:off x="7649034" y="1136473"/>
-            <a:ext cx="9512095" cy="6286441"/>
+            <a:off x="7598177" y="1104516"/>
+            <a:ext cx="9572244" cy="6352783"/>
           </a:xfrm>
           <a:prstGeom prst="rect">
             <a:avLst/>
@@ -9104,41 +9217,6 @@
                                         <p:cTn id="28" dur="500"/>
                                         <p:tgtEl>
                                           <p:spTgt spid="79"/>
-                                        </p:tgtEl>
-                                      </p:cBhvr>
-                                    </p:animEffect>
-                                  </p:childTnLst>
-                                </p:cTn>
-                              </p:par>
-                              <p:par>
-                                <p:cTn id="29" presetID="10" presetClass="entr" presetSubtype="0" fill="hold" nodeType="withEffect">
-                                  <p:stCondLst>
-                                    <p:cond delay="0"/>
-                                  </p:stCondLst>
-                                  <p:childTnLst>
-                                    <p:set>
-                                      <p:cBhvr>
-                                        <p:cTn id="30" dur="1" fill="hold">
-                                          <p:stCondLst>
-                                            <p:cond delay="0"/>
-                                          </p:stCondLst>
-                                        </p:cTn>
-                                        <p:tgtEl>
-                                          <p:spTgt spid="8"/>
-                                        </p:tgtEl>
-                                        <p:attrNameLst>
-                                          <p:attrName>style.visibility</p:attrName>
-                                        </p:attrNameLst>
-                                      </p:cBhvr>
-                                      <p:to>
-                                        <p:strVal val="visible"/>
-                                      </p:to>
-                                    </p:set>
-                                    <p:animEffect transition="in" filter="fade">
-                                      <p:cBhvr>
-                                        <p:cTn id="31" dur="500"/>
-                                        <p:tgtEl>
-                                          <p:spTgt spid="8"/>
                                         </p:tgtEl>
                                       </p:cBhvr>
                                     </p:animEffect>

</xml_diff>